<commit_message>
provision clients and new layout
</commit_message>
<xml_diff>
--- a/Project Deck.pptx
+++ b/Project Deck.pptx
@@ -3683,7 +3683,7 @@
           <a:p>
             <a:fld id="{ABB884F6-2691-FB4A-97A0-F88D3C3898E6}" type="datetimeFigureOut">
               <a:rPr lang="en-US" smtClean="0"/>
-              <a:t>4/8/16</a:t>
+              <a:t>4/9/16</a:t>
             </a:fld>
             <a:endParaRPr lang="en-US"/>
           </a:p>
@@ -3853,7 +3853,7 @@
           <a:p>
             <a:fld id="{ABB884F6-2691-FB4A-97A0-F88D3C3898E6}" type="datetimeFigureOut">
               <a:rPr lang="en-US" smtClean="0"/>
-              <a:t>4/8/16</a:t>
+              <a:t>4/9/16</a:t>
             </a:fld>
             <a:endParaRPr lang="en-US"/>
           </a:p>
@@ -4033,7 +4033,7 @@
           <a:p>
             <a:fld id="{ABB884F6-2691-FB4A-97A0-F88D3C3898E6}" type="datetimeFigureOut">
               <a:rPr lang="en-US" smtClean="0"/>
-              <a:t>4/8/16</a:t>
+              <a:t>4/9/16</a:t>
             </a:fld>
             <a:endParaRPr lang="en-US"/>
           </a:p>
@@ -4203,7 +4203,7 @@
           <a:p>
             <a:fld id="{ABB884F6-2691-FB4A-97A0-F88D3C3898E6}" type="datetimeFigureOut">
               <a:rPr lang="en-US" smtClean="0"/>
-              <a:t>4/8/16</a:t>
+              <a:t>4/9/16</a:t>
             </a:fld>
             <a:endParaRPr lang="en-US"/>
           </a:p>
@@ -4449,7 +4449,7 @@
           <a:p>
             <a:fld id="{ABB884F6-2691-FB4A-97A0-F88D3C3898E6}" type="datetimeFigureOut">
               <a:rPr lang="en-US" smtClean="0"/>
-              <a:t>4/8/16</a:t>
+              <a:t>4/9/16</a:t>
             </a:fld>
             <a:endParaRPr lang="en-US"/>
           </a:p>
@@ -4737,7 +4737,7 @@
           <a:p>
             <a:fld id="{ABB884F6-2691-FB4A-97A0-F88D3C3898E6}" type="datetimeFigureOut">
               <a:rPr lang="en-US" smtClean="0"/>
-              <a:t>4/8/16</a:t>
+              <a:t>4/9/16</a:t>
             </a:fld>
             <a:endParaRPr lang="en-US"/>
           </a:p>
@@ -5159,7 +5159,7 @@
           <a:p>
             <a:fld id="{ABB884F6-2691-FB4A-97A0-F88D3C3898E6}" type="datetimeFigureOut">
               <a:rPr lang="en-US" smtClean="0"/>
-              <a:t>4/8/16</a:t>
+              <a:t>4/9/16</a:t>
             </a:fld>
             <a:endParaRPr lang="en-US"/>
           </a:p>
@@ -5277,7 +5277,7 @@
           <a:p>
             <a:fld id="{ABB884F6-2691-FB4A-97A0-F88D3C3898E6}" type="datetimeFigureOut">
               <a:rPr lang="en-US" smtClean="0"/>
-              <a:t>4/8/16</a:t>
+              <a:t>4/9/16</a:t>
             </a:fld>
             <a:endParaRPr lang="en-US"/>
           </a:p>
@@ -5372,7 +5372,7 @@
           <a:p>
             <a:fld id="{ABB884F6-2691-FB4A-97A0-F88D3C3898E6}" type="datetimeFigureOut">
               <a:rPr lang="en-US" smtClean="0"/>
-              <a:t>4/8/16</a:t>
+              <a:t>4/9/16</a:t>
             </a:fld>
             <a:endParaRPr lang="en-US"/>
           </a:p>
@@ -5649,7 +5649,7 @@
           <a:p>
             <a:fld id="{ABB884F6-2691-FB4A-97A0-F88D3C3898E6}" type="datetimeFigureOut">
               <a:rPr lang="en-US" smtClean="0"/>
-              <a:t>4/8/16</a:t>
+              <a:t>4/9/16</a:t>
             </a:fld>
             <a:endParaRPr lang="en-US"/>
           </a:p>
@@ -5902,7 +5902,7 @@
           <a:p>
             <a:fld id="{ABB884F6-2691-FB4A-97A0-F88D3C3898E6}" type="datetimeFigureOut">
               <a:rPr lang="en-US" smtClean="0"/>
-              <a:t>4/8/16</a:t>
+              <a:t>4/9/16</a:t>
             </a:fld>
             <a:endParaRPr lang="en-US"/>
           </a:p>
@@ -6115,7 +6115,7 @@
           <a:p>
             <a:fld id="{ABB884F6-2691-FB4A-97A0-F88D3C3898E6}" type="datetimeFigureOut">
               <a:rPr lang="en-US" smtClean="0"/>
-              <a:t>4/8/16</a:t>
+              <a:t>4/9/16</a:t>
             </a:fld>
             <a:endParaRPr lang="en-US"/>
           </a:p>
@@ -6674,17 +6674,27 @@
           <a:p>
             <a:r>
               <a:rPr lang="en-US" sz="2400" dirty="0" smtClean="0"/>
-              <a:t>Create a new organization (w admin) for demos without many test projects</a:t>
+              <a:t>Configuration page for selecting </a:t>
+            </a:r>
+            <a:r>
+              <a:rPr lang="en-US" sz="2400" smtClean="0"/>
+              <a:t>two masters</a:t>
             </a:r>
           </a:p>
           <a:p>
             <a:r>
               <a:rPr lang="en-US" sz="2400" dirty="0" smtClean="0"/>
-              <a:t>Build retail analytics-like project with data and dashboard content on the new </a:t>
+              <a:t>Create </a:t>
             </a:r>
             <a:r>
               <a:rPr lang="en-US" sz="2400" dirty="0" smtClean="0"/>
-              <a:t>machine</a:t>
+              <a:t>a new organization (w admin) for demos without many test projects</a:t>
+            </a:r>
+          </a:p>
+          <a:p>
+            <a:r>
+              <a:rPr lang="en-US" sz="2400" dirty="0" smtClean="0"/>
+              <a:t>Build retail analytics-like project with data and dashboard content on the new machine</a:t>
             </a:r>
           </a:p>
           <a:p>
@@ -6697,10 +6707,9 @@
               <a:t>remove_segment</a:t>
             </a:r>
             <a:r>
-              <a:rPr lang="en-US" sz="2400" smtClean="0"/>
+              <a:rPr lang="en-US" sz="2400" dirty="0" smtClean="0"/>
               <a:t> syntax</a:t>
             </a:r>
-            <a:endParaRPr lang="en-US" sz="2400" dirty="0" smtClean="0"/>
           </a:p>
           <a:p>
             <a:pPr marL="0" indent="0">

</xml_diff>